<commit_message>
change details in slide
</commit_message>
<xml_diff>
--- a/progressSlide/present_ProfileProject.pptx
+++ b/progressSlide/present_ProfileProject.pptx
@@ -4521,13 +4521,13 @@
   <p:clrMapOvr>
     <a:masterClrMapping/>
   </p:clrMapOvr>
-  <mc:AlternateContent xmlns:mc="http://schemas.openxmlformats.org/markup-compatibility/2006">
-    <mc:Choice xmlns:p159="http://schemas.microsoft.com/office/powerpoint/2015/09/main" Requires="p159">
+  <mc:AlternateContent xmlns:mc="http://schemas.openxmlformats.org/markup-compatibility/2006" xmlns:p159="http://schemas.microsoft.com/office/powerpoint/2015/09/main">
+    <mc:Choice Requires="p159">
       <p:transition xmlns:p14="http://schemas.microsoft.com/office/powerpoint/2010/main" spd="slow" p14:dur="2000">
         <p159:morph option="byObject"/>
       </p:transition>
     </mc:Choice>
-    <mc:Fallback>
+    <mc:Fallback xmlns="">
       <p:transition spd="slow">
         <p:fade/>
       </p:transition>
@@ -7098,13 +7098,13 @@
   <p:clrMapOvr>
     <a:masterClrMapping/>
   </p:clrMapOvr>
-  <mc:AlternateContent xmlns:mc="http://schemas.openxmlformats.org/markup-compatibility/2006">
-    <mc:Choice xmlns:p159="http://schemas.microsoft.com/office/powerpoint/2015/09/main" Requires="p159">
+  <mc:AlternateContent xmlns:mc="http://schemas.openxmlformats.org/markup-compatibility/2006" xmlns:p159="http://schemas.microsoft.com/office/powerpoint/2015/09/main">
+    <mc:Choice Requires="p159">
       <p:transition spd="med">
         <p159:morph option="byObject"/>
       </p:transition>
     </mc:Choice>
-    <mc:Fallback>
+    <mc:Fallback xmlns="">
       <p:transition spd="med">
         <p:fade/>
       </p:transition>
@@ -8069,7 +8069,7 @@
         <p:spPr>
           <a:xfrm>
             <a:off x="852616" y="1346886"/>
-            <a:ext cx="9662984" cy="2308324"/>
+            <a:ext cx="9662984" cy="2800767"/>
           </a:xfrm>
           <a:prstGeom prst="rect">
             <a:avLst/>
@@ -8184,6 +8184,49 @@
                 <a:cs typeface="Anakotmai Medium" pitchFamily="2" charset="-34"/>
               </a:rPr>
               <a:t> ที่เฉพาะของอาจารย์มากพอ</a:t>
+            </a:r>
+            <a:endParaRPr lang="en-US" sz="3200" dirty="0">
+              <a:solidFill>
+                <a:srgbClr val="055256"/>
+              </a:solidFill>
+              <a:latin typeface="Anakotmai Medium" pitchFamily="2" charset="-34"/>
+              <a:cs typeface="Anakotmai Medium" pitchFamily="2" charset="-34"/>
+            </a:endParaRPr>
+          </a:p>
+          <a:p>
+            <a:pPr marL="285750" indent="-285750">
+              <a:buFont typeface="Arial" panose="020B0604020202020204" pitchFamily="34" charset="0"/>
+              <a:buChar char="•"/>
+            </a:pPr>
+            <a:r>
+              <a:rPr lang="th-TH" sz="3200" dirty="0">
+                <a:solidFill>
+                  <a:srgbClr val="055256"/>
+                </a:solidFill>
+                <a:latin typeface="Anakotmai Medium" pitchFamily="2" charset="-34"/>
+                <a:cs typeface="Anakotmai Medium" pitchFamily="2" charset="-34"/>
+              </a:rPr>
+              <a:t>การ</a:t>
+            </a:r>
+            <a:r>
+              <a:rPr lang="en-US" sz="3200" dirty="0">
+                <a:solidFill>
+                  <a:srgbClr val="055256"/>
+                </a:solidFill>
+                <a:latin typeface="Anakotmai Medium" pitchFamily="2" charset="-34"/>
+                <a:cs typeface="Anakotmai Medium" pitchFamily="2" charset="-34"/>
+              </a:rPr>
+              <a:t> add tag</a:t>
+            </a:r>
+            <a:r>
+              <a:rPr lang="th-TH" sz="3200" dirty="0">
+                <a:solidFill>
+                  <a:srgbClr val="055256"/>
+                </a:solidFill>
+                <a:latin typeface="Anakotmai Medium" pitchFamily="2" charset="-34"/>
+                <a:cs typeface="Anakotmai Medium" pitchFamily="2" charset="-34"/>
+              </a:rPr>
+              <a:t> ไม่เป็นของแต่ละคน</a:t>
             </a:r>
           </a:p>
           <a:p>
@@ -10355,13 +10398,13 @@
   <p:clrMapOvr>
     <a:masterClrMapping/>
   </p:clrMapOvr>
-  <mc:AlternateContent xmlns:mc="http://schemas.openxmlformats.org/markup-compatibility/2006">
-    <mc:Choice xmlns:p159="http://schemas.microsoft.com/office/powerpoint/2015/09/main" Requires="p159">
+  <mc:AlternateContent xmlns:mc="http://schemas.openxmlformats.org/markup-compatibility/2006" xmlns:p159="http://schemas.microsoft.com/office/powerpoint/2015/09/main">
+    <mc:Choice Requires="p159">
       <p:transition spd="med">
         <p159:morph option="byObject"/>
       </p:transition>
     </mc:Choice>
-    <mc:Fallback>
+    <mc:Fallback xmlns="">
       <p:transition spd="med">
         <p:fade/>
       </p:transition>
@@ -10890,13 +10933,13 @@
   <p:clrMapOvr>
     <a:masterClrMapping/>
   </p:clrMapOvr>
-  <mc:AlternateContent xmlns:mc="http://schemas.openxmlformats.org/markup-compatibility/2006">
-    <mc:Choice xmlns:p159="http://schemas.microsoft.com/office/powerpoint/2015/09/main" Requires="p159">
+  <mc:AlternateContent xmlns:mc="http://schemas.openxmlformats.org/markup-compatibility/2006" xmlns:p159="http://schemas.microsoft.com/office/powerpoint/2015/09/main">
+    <mc:Choice Requires="p159">
       <p:transition spd="med" advClick="0" advTm="0">
         <p159:morph option="byObject"/>
       </p:transition>
     </mc:Choice>
-    <mc:Fallback>
+    <mc:Fallback xmlns="">
       <p:transition spd="med" advClick="0" advTm="0">
         <p:fade/>
       </p:transition>
@@ -11425,13 +11468,13 @@
   <p:clrMapOvr>
     <a:masterClrMapping/>
   </p:clrMapOvr>
-  <mc:AlternateContent xmlns:mc="http://schemas.openxmlformats.org/markup-compatibility/2006">
-    <mc:Choice xmlns:p159="http://schemas.microsoft.com/office/powerpoint/2015/09/main" Requires="p159">
+  <mc:AlternateContent xmlns:mc="http://schemas.openxmlformats.org/markup-compatibility/2006" xmlns:p159="http://schemas.microsoft.com/office/powerpoint/2015/09/main">
+    <mc:Choice Requires="p159">
       <p:transition spd="med" advClick="0" advTm="0">
         <p159:morph option="byObject"/>
       </p:transition>
     </mc:Choice>
-    <mc:Fallback>
+    <mc:Fallback xmlns="">
       <p:transition spd="med" advClick="0" advTm="0">
         <p:fade/>
       </p:transition>

</xml_diff>